<commit_message>
Events samples in progress
</commit_message>
<xml_diff>
--- a/Delegates and Events.pptx
+++ b/Delegates and Events.pptx
@@ -441,7 +441,7 @@
           <a:p>
             <a:fld id="{7F5E9BF7-95E4-A242-BA1D-05FDCF603BE6}" type="datetime1">
               <a:rPr lang="en-US" smtClean="0"/>
-              <a:t>06-Dec-17</a:t>
+              <a:t>09-Dec-17</a:t>
             </a:fld>
             <a:endParaRPr lang="en-US"/>
           </a:p>
@@ -607,7 +607,7 @@
           <a:p>
             <a:fld id="{165DBCB1-0306-AD41-9452-11E7C08D5C04}" type="datetime1">
               <a:rPr lang="en-US" smtClean="0"/>
-              <a:t>06-Dec-17</a:t>
+              <a:t>09-Dec-17</a:t>
             </a:fld>
             <a:endParaRPr lang="en-US"/>
           </a:p>
@@ -962,11 +962,7 @@
           <a:p>
             <a:r>
               <a:rPr lang="en-US" baseline="0" dirty="0" smtClean="0"/>
-              <a:t>A delegate is similar to a class. You can create an instance of it, and when you do so, you pass in the function name as a parameter to the delegate constructor, and it is to this function the delegate will point to</a:t>
-            </a:r>
-            <a:r>
-              <a:rPr lang="en-US" baseline="0" dirty="0" smtClean="0"/>
-              <a:t>.</a:t>
+              <a:t>A delegate is similar to a class. You can create an instance of it, and when you do so, you pass in the function name as a parameter to the delegate constructor, and it is to this function the delegate will point to.</a:t>
             </a:r>
           </a:p>
         </p:txBody>
@@ -1180,12 +1176,16 @@
           <a:lstStyle/>
           <a:p>
             <a:r>
-              <a:rPr lang="en-US" dirty="0" err="1" smtClean="0"/>
-              <a:t>List.Find</a:t>
-            </a:r>
-            <a:r>
-              <a:rPr lang="en-US" dirty="0" smtClean="0"/>
-              <a:t>()</a:t>
+              <a:rPr lang="en-IN" sz="1200" b="0" i="0" kern="1200" dirty="0" smtClean="0">
+                <a:solidFill>
+                  <a:schemeClr val="tx1"/>
+                </a:solidFill>
+                <a:effectLst/>
+                <a:latin typeface="+mn-lt"/>
+                <a:ea typeface="+mn-ea"/>
+                <a:cs typeface="+mn-cs"/>
+              </a:rPr>
+              <a:t>Multicast delegate is an extension of normal delegate. It helps you to point more than one method at a single moment of time.</a:t>
             </a:r>
             <a:endParaRPr lang="en-US" dirty="0"/>
           </a:p>
@@ -1208,7 +1208,7 @@
           <a:p>
             <a:fld id="{7AE90029-A909-AD4E-9775-A0D64990AD22}" type="slidenum">
               <a:rPr lang="en-US" smtClean="0"/>
-              <a:t>15</a:t>
+              <a:t>12</a:t>
             </a:fld>
             <a:endParaRPr lang="en-US"/>
           </a:p>
@@ -1217,7 +1217,7 @@
     </p:spTree>
     <p:extLst>
       <p:ext uri="{BB962C8B-B14F-4D97-AF65-F5344CB8AC3E}">
-        <p14:creationId xmlns:p14="http://schemas.microsoft.com/office/powerpoint/2010/main" val="3573284846"/>
+        <p14:creationId xmlns:p14="http://schemas.microsoft.com/office/powerpoint/2010/main" val="2293863390"/>
       </p:ext>
     </p:extLst>
   </p:cSld>
@@ -1272,6 +1272,98 @@
           <a:lstStyle/>
           <a:p>
             <a:r>
+              <a:rPr lang="en-US" dirty="0" err="1" smtClean="0"/>
+              <a:t>List.Find</a:t>
+            </a:r>
+            <a:r>
+              <a:rPr lang="en-US" dirty="0" smtClean="0"/>
+              <a:t>()</a:t>
+            </a:r>
+            <a:endParaRPr lang="en-US" dirty="0"/>
+          </a:p>
+        </p:txBody>
+      </p:sp>
+      <p:sp>
+        <p:nvSpPr>
+          <p:cNvPr id="4" name="Slide Number Placeholder 3"/>
+          <p:cNvSpPr>
+            <a:spLocks noGrp="1"/>
+          </p:cNvSpPr>
+          <p:nvPr>
+            <p:ph type="sldNum" sz="quarter" idx="10"/>
+          </p:nvPr>
+        </p:nvSpPr>
+        <p:spPr/>
+        <p:txBody>
+          <a:bodyPr/>
+          <a:lstStyle/>
+          <a:p>
+            <a:fld id="{7AE90029-A909-AD4E-9775-A0D64990AD22}" type="slidenum">
+              <a:rPr lang="en-US" smtClean="0"/>
+              <a:t>15</a:t>
+            </a:fld>
+            <a:endParaRPr lang="en-US"/>
+          </a:p>
+        </p:txBody>
+      </p:sp>
+    </p:spTree>
+    <p:extLst>
+      <p:ext uri="{BB962C8B-B14F-4D97-AF65-F5344CB8AC3E}">
+        <p14:creationId xmlns:p14="http://schemas.microsoft.com/office/powerpoint/2010/main" val="3573284846"/>
+      </p:ext>
+    </p:extLst>
+  </p:cSld>
+  <p:clrMapOvr>
+    <a:masterClrMapping/>
+  </p:clrMapOvr>
+</p:notes>
+</file>
+
+<file path=ppt/notesSlides/notesSlide5.xml><?xml version="1.0" encoding="utf-8"?>
+<p:notes xmlns:a="http://schemas.openxmlformats.org/drawingml/2006/main" xmlns:r="http://schemas.openxmlformats.org/officeDocument/2006/relationships" xmlns:p="http://schemas.openxmlformats.org/presentationml/2006/main">
+  <p:cSld>
+    <p:spTree>
+      <p:nvGrpSpPr>
+        <p:cNvPr id="1" name=""/>
+        <p:cNvGrpSpPr/>
+        <p:nvPr/>
+      </p:nvGrpSpPr>
+      <p:grpSpPr>
+        <a:xfrm>
+          <a:off x="0" y="0"/>
+          <a:ext cx="0" cy="0"/>
+          <a:chOff x="0" y="0"/>
+          <a:chExt cx="0" cy="0"/>
+        </a:xfrm>
+      </p:grpSpPr>
+      <p:sp>
+        <p:nvSpPr>
+          <p:cNvPr id="2" name="Slide Image Placeholder 1"/>
+          <p:cNvSpPr>
+            <a:spLocks noGrp="1" noRot="1" noChangeAspect="1"/>
+          </p:cNvSpPr>
+          <p:nvPr>
+            <p:ph type="sldImg"/>
+          </p:nvPr>
+        </p:nvSpPr>
+        <p:spPr/>
+      </p:sp>
+      <p:sp>
+        <p:nvSpPr>
+          <p:cNvPr id="3" name="Notes Placeholder 2"/>
+          <p:cNvSpPr>
+            <a:spLocks noGrp="1"/>
+          </p:cNvSpPr>
+          <p:nvPr>
+            <p:ph type="body" idx="1"/>
+          </p:nvPr>
+        </p:nvSpPr>
+        <p:spPr/>
+        <p:txBody>
+          <a:bodyPr/>
+          <a:lstStyle/>
+          <a:p>
+            <a:r>
               <a:rPr lang="en-IN" sz="1200" b="0" i="0" kern="1200" dirty="0" smtClean="0">
                 <a:solidFill>
                   <a:schemeClr val="tx1"/>
@@ -1381,6 +1473,755 @@
     <p:extLst>
       <p:ext uri="{BB962C8B-B14F-4D97-AF65-F5344CB8AC3E}">
         <p14:creationId xmlns:p14="http://schemas.microsoft.com/office/powerpoint/2010/main" val="1426749434"/>
+      </p:ext>
+    </p:extLst>
+  </p:cSld>
+  <p:clrMapOvr>
+    <a:masterClrMapping/>
+  </p:clrMapOvr>
+</p:notes>
+</file>
+
+<file path=ppt/notesSlides/notesSlide6.xml><?xml version="1.0" encoding="utf-8"?>
+<p:notes xmlns:a="http://schemas.openxmlformats.org/drawingml/2006/main" xmlns:r="http://schemas.openxmlformats.org/officeDocument/2006/relationships" xmlns:p="http://schemas.openxmlformats.org/presentationml/2006/main">
+  <p:cSld>
+    <p:spTree>
+      <p:nvGrpSpPr>
+        <p:cNvPr id="1" name=""/>
+        <p:cNvGrpSpPr/>
+        <p:nvPr/>
+      </p:nvGrpSpPr>
+      <p:grpSpPr>
+        <a:xfrm>
+          <a:off x="0" y="0"/>
+          <a:ext cx="0" cy="0"/>
+          <a:chOff x="0" y="0"/>
+          <a:chExt cx="0" cy="0"/>
+        </a:xfrm>
+      </p:grpSpPr>
+      <p:sp>
+        <p:nvSpPr>
+          <p:cNvPr id="2" name="Slide Image Placeholder 1"/>
+          <p:cNvSpPr>
+            <a:spLocks noGrp="1" noRot="1" noChangeAspect="1"/>
+          </p:cNvSpPr>
+          <p:nvPr>
+            <p:ph type="sldImg"/>
+          </p:nvPr>
+        </p:nvSpPr>
+        <p:spPr/>
+      </p:sp>
+      <p:sp>
+        <p:nvSpPr>
+          <p:cNvPr id="3" name="Notes Placeholder 2"/>
+          <p:cNvSpPr>
+            <a:spLocks noGrp="1"/>
+          </p:cNvSpPr>
+          <p:nvPr>
+            <p:ph type="body" idx="1"/>
+          </p:nvPr>
+        </p:nvSpPr>
+        <p:spPr/>
+        <p:txBody>
+          <a:bodyPr/>
+          <a:lstStyle/>
+          <a:p>
+            <a:r>
+              <a:rPr lang="en-IN" sz="1200" b="0" i="0" kern="1200" dirty="0" smtClean="0">
+                <a:solidFill>
+                  <a:schemeClr val="tx1"/>
+                </a:solidFill>
+                <a:effectLst/>
+                <a:latin typeface="+mn-lt"/>
+                <a:ea typeface="+mn-ea"/>
+                <a:cs typeface="+mn-cs"/>
+              </a:rPr>
+              <a:t>C# provides event driven programming by adding support through </a:t>
+            </a:r>
+            <a:r>
+              <a:rPr lang="en-IN" sz="1200" b="1" i="0" kern="1200" dirty="0" smtClean="0">
+                <a:solidFill>
+                  <a:schemeClr val="tx1"/>
+                </a:solidFill>
+                <a:effectLst/>
+                <a:latin typeface="+mn-lt"/>
+                <a:ea typeface="+mn-ea"/>
+                <a:cs typeface="+mn-cs"/>
+              </a:rPr>
+              <a:t>Events</a:t>
+            </a:r>
+            <a:r>
+              <a:rPr lang="en-IN" sz="1200" b="0" i="0" kern="1200" dirty="0" smtClean="0">
+                <a:solidFill>
+                  <a:schemeClr val="tx1"/>
+                </a:solidFill>
+                <a:effectLst/>
+                <a:latin typeface="+mn-lt"/>
+                <a:ea typeface="+mn-ea"/>
+                <a:cs typeface="+mn-cs"/>
+              </a:rPr>
+              <a:t>. </a:t>
+            </a:r>
+          </a:p>
+          <a:p>
+            <a:r>
+              <a:rPr lang="en-IN" sz="1200" b="0" i="0" kern="1200" dirty="0" smtClean="0">
+                <a:solidFill>
+                  <a:schemeClr val="tx1"/>
+                </a:solidFill>
+                <a:effectLst/>
+                <a:latin typeface="+mn-lt"/>
+                <a:ea typeface="+mn-ea"/>
+                <a:cs typeface="+mn-cs"/>
+              </a:rPr>
+              <a:t>It is a way to provide notifications to client when something happens to an object. </a:t>
+            </a:r>
+          </a:p>
+          <a:p>
+            <a:r>
+              <a:rPr lang="en-IN" sz="1200" b="0" i="0" kern="1200" dirty="0" smtClean="0">
+                <a:solidFill>
+                  <a:schemeClr val="tx1"/>
+                </a:solidFill>
+                <a:effectLst/>
+                <a:latin typeface="+mn-lt"/>
+                <a:ea typeface="+mn-ea"/>
+                <a:cs typeface="+mn-cs"/>
+              </a:rPr>
+              <a:t>Events and Delegates are tightly coupled concept because event handling requires Delegate for the dispatch of Event.</a:t>
+            </a:r>
+          </a:p>
+          <a:p>
+            <a:endParaRPr lang="en-IN" sz="1200" b="0" i="0" kern="1200" dirty="0" smtClean="0">
+              <a:solidFill>
+                <a:schemeClr val="tx1"/>
+              </a:solidFill>
+              <a:effectLst/>
+              <a:latin typeface="+mn-lt"/>
+              <a:ea typeface="+mn-ea"/>
+              <a:cs typeface="+mn-cs"/>
+            </a:endParaRPr>
+          </a:p>
+          <a:p>
+            <a:pPr marL="0" marR="0" indent="0" algn="l" defTabSz="457189" rtl="0" eaLnBrk="1" fontAlgn="auto" latinLnBrk="0" hangingPunct="1">
+              <a:lnSpc>
+                <a:spcPct val="100000"/>
+              </a:lnSpc>
+              <a:spcBef>
+                <a:spcPts val="0"/>
+              </a:spcBef>
+              <a:spcAft>
+                <a:spcPts val="0"/>
+              </a:spcAft>
+              <a:buClrTx/>
+              <a:buSzTx/>
+              <a:buFontTx/>
+              <a:buNone/>
+              <a:tabLst/>
+              <a:defRPr/>
+            </a:pPr>
+            <a:r>
+              <a:rPr lang="en-IN" sz="1200" b="1" i="0" kern="1200" dirty="0" smtClean="0">
+                <a:solidFill>
+                  <a:schemeClr val="tx1"/>
+                </a:solidFill>
+                <a:effectLst/>
+                <a:latin typeface="+mn-lt"/>
+                <a:ea typeface="+mn-ea"/>
+                <a:cs typeface="+mn-cs"/>
+              </a:rPr>
+              <a:t>Implementation of Event is a 3 step process.</a:t>
+            </a:r>
+            <a:endParaRPr lang="en-IN" sz="1200" b="0" i="0" kern="1200" dirty="0" smtClean="0">
+              <a:solidFill>
+                <a:schemeClr val="tx1"/>
+              </a:solidFill>
+              <a:effectLst/>
+              <a:latin typeface="+mn-lt"/>
+              <a:ea typeface="+mn-ea"/>
+              <a:cs typeface="+mn-cs"/>
+            </a:endParaRPr>
+          </a:p>
+          <a:p>
+            <a:pPr marL="228600" indent="-228600">
+              <a:buAutoNum type="arabicPeriod"/>
+            </a:pPr>
+            <a:r>
+              <a:rPr lang="en-IN" sz="1200" b="0" i="0" kern="1200" dirty="0" smtClean="0">
+                <a:solidFill>
+                  <a:schemeClr val="tx1"/>
+                </a:solidFill>
+                <a:effectLst/>
+                <a:latin typeface="+mn-lt"/>
+                <a:ea typeface="+mn-ea"/>
+                <a:cs typeface="+mn-cs"/>
+              </a:rPr>
+              <a:t>Declare - public delegate void </a:t>
+            </a:r>
+            <a:r>
+              <a:rPr lang="en-IN" sz="1200" b="0" i="0" kern="1200" dirty="0" err="1" smtClean="0">
+                <a:solidFill>
+                  <a:schemeClr val="tx1"/>
+                </a:solidFill>
+                <a:effectLst/>
+                <a:latin typeface="+mn-lt"/>
+                <a:ea typeface="+mn-ea"/>
+                <a:cs typeface="+mn-cs"/>
+              </a:rPr>
+              <a:t>CallEveryOne</a:t>
+            </a:r>
+            <a:r>
+              <a:rPr lang="en-IN" sz="1200" b="0" i="0" kern="1200" dirty="0" smtClean="0">
+                <a:solidFill>
+                  <a:schemeClr val="tx1"/>
+                </a:solidFill>
+                <a:effectLst/>
+                <a:latin typeface="+mn-lt"/>
+                <a:ea typeface="+mn-ea"/>
+                <a:cs typeface="+mn-cs"/>
+              </a:rPr>
+              <a:t>()</a:t>
+            </a:r>
+          </a:p>
+          <a:p>
+            <a:pPr marL="228600" indent="-228600">
+              <a:buAutoNum type="arabicPeriod"/>
+            </a:pPr>
+            <a:r>
+              <a:rPr lang="en-IN" sz="1200" b="0" i="0" kern="1200" dirty="0" smtClean="0">
+                <a:solidFill>
+                  <a:schemeClr val="tx1"/>
+                </a:solidFill>
+                <a:effectLst/>
+                <a:latin typeface="+mn-lt"/>
+                <a:ea typeface="+mn-ea"/>
+                <a:cs typeface="+mn-cs"/>
+              </a:rPr>
+              <a:t>Create - public Event </a:t>
+            </a:r>
+            <a:r>
+              <a:rPr lang="en-IN" sz="1200" b="0" i="0" kern="1200" dirty="0" err="1" smtClean="0">
+                <a:solidFill>
+                  <a:schemeClr val="tx1"/>
+                </a:solidFill>
+                <a:effectLst/>
+                <a:latin typeface="+mn-lt"/>
+                <a:ea typeface="+mn-ea"/>
+                <a:cs typeface="+mn-cs"/>
+              </a:rPr>
+              <a:t>CallEveryOne</a:t>
+            </a:r>
+            <a:r>
+              <a:rPr lang="en-IN" sz="1200" b="0" i="0" kern="1200" dirty="0" smtClean="0">
+                <a:solidFill>
+                  <a:schemeClr val="tx1"/>
+                </a:solidFill>
+                <a:effectLst/>
+                <a:latin typeface="+mn-lt"/>
+                <a:ea typeface="+mn-ea"/>
+                <a:cs typeface="+mn-cs"/>
+              </a:rPr>
+              <a:t> </a:t>
+            </a:r>
+            <a:r>
+              <a:rPr lang="en-IN" sz="1200" b="0" i="0" kern="1200" dirty="0" err="1" smtClean="0">
+                <a:solidFill>
+                  <a:schemeClr val="tx1"/>
+                </a:solidFill>
+                <a:effectLst/>
+                <a:latin typeface="+mn-lt"/>
+                <a:ea typeface="+mn-ea"/>
+                <a:cs typeface="+mn-cs"/>
+              </a:rPr>
+              <a:t>objEventCallEveryOne</a:t>
+            </a:r>
+            <a:r>
+              <a:rPr lang="en-IN" sz="1200" b="0" i="0" kern="1200" dirty="0" smtClean="0">
+                <a:solidFill>
+                  <a:schemeClr val="tx1"/>
+                </a:solidFill>
+                <a:effectLst/>
+                <a:latin typeface="+mn-lt"/>
+                <a:ea typeface="+mn-ea"/>
+                <a:cs typeface="+mn-cs"/>
+              </a:rPr>
+              <a:t>;</a:t>
+            </a:r>
+          </a:p>
+          <a:p>
+            <a:pPr marL="228600" indent="-228600">
+              <a:buAutoNum type="arabicPeriod"/>
+            </a:pPr>
+            <a:r>
+              <a:rPr lang="en-IN" sz="1200" b="0" i="0" kern="1200" dirty="0" smtClean="0">
+                <a:solidFill>
+                  <a:schemeClr val="tx1"/>
+                </a:solidFill>
+                <a:effectLst/>
+                <a:latin typeface="+mn-lt"/>
+                <a:ea typeface="+mn-ea"/>
+                <a:cs typeface="+mn-cs"/>
+              </a:rPr>
+              <a:t>Call- </a:t>
+            </a:r>
+            <a:r>
+              <a:rPr lang="en-IN" sz="1200" b="0" i="0" kern="1200" dirty="0" err="1" smtClean="0">
+                <a:solidFill>
+                  <a:schemeClr val="tx1"/>
+                </a:solidFill>
+                <a:effectLst/>
+                <a:latin typeface="+mn-lt"/>
+                <a:ea typeface="+mn-ea"/>
+                <a:cs typeface="+mn-cs"/>
+              </a:rPr>
+              <a:t>objEventCallEveryOne</a:t>
+            </a:r>
+            <a:r>
+              <a:rPr lang="en-IN" sz="1200" b="0" i="0" kern="1200" dirty="0" smtClean="0">
+                <a:solidFill>
+                  <a:schemeClr val="tx1"/>
+                </a:solidFill>
+                <a:effectLst/>
+                <a:latin typeface="+mn-lt"/>
+                <a:ea typeface="+mn-ea"/>
+                <a:cs typeface="+mn-cs"/>
+              </a:rPr>
+              <a:t>;</a:t>
+            </a:r>
+          </a:p>
+          <a:p>
+            <a:pPr marL="0" indent="0">
+              <a:buNone/>
+            </a:pPr>
+            <a:endParaRPr lang="en-IN" sz="1200" b="0" i="0" kern="1200" dirty="0" smtClean="0">
+              <a:solidFill>
+                <a:schemeClr val="tx1"/>
+              </a:solidFill>
+              <a:effectLst/>
+              <a:latin typeface="+mn-lt"/>
+              <a:ea typeface="+mn-ea"/>
+              <a:cs typeface="+mn-cs"/>
+            </a:endParaRPr>
+          </a:p>
+          <a:p>
+            <a:pPr marL="0" marR="0" indent="0" algn="l" defTabSz="457189" rtl="0" eaLnBrk="1" fontAlgn="auto" latinLnBrk="0" hangingPunct="1">
+              <a:lnSpc>
+                <a:spcPct val="100000"/>
+              </a:lnSpc>
+              <a:spcBef>
+                <a:spcPts val="0"/>
+              </a:spcBef>
+              <a:spcAft>
+                <a:spcPts val="0"/>
+              </a:spcAft>
+              <a:buClrTx/>
+              <a:buSzTx/>
+              <a:buFontTx/>
+              <a:buNone/>
+              <a:tabLst/>
+              <a:defRPr/>
+            </a:pPr>
+            <a:r>
+              <a:rPr lang="en-IN" sz="1200" b="1" i="0" kern="1200" dirty="0" smtClean="0">
+                <a:solidFill>
+                  <a:schemeClr val="tx1"/>
+                </a:solidFill>
+                <a:effectLst/>
+                <a:latin typeface="+mn-lt"/>
+                <a:ea typeface="+mn-ea"/>
+                <a:cs typeface="+mn-cs"/>
+              </a:rPr>
+              <a:t>Difference between Delegates and Events</a:t>
+            </a:r>
+            <a:endParaRPr lang="en-US" dirty="0" smtClean="0"/>
+          </a:p>
+          <a:p>
+            <a:r>
+              <a:rPr lang="en-IN" sz="1200" b="0" i="0" kern="1200" dirty="0" smtClean="0">
+                <a:solidFill>
+                  <a:schemeClr val="tx1"/>
+                </a:solidFill>
+                <a:effectLst/>
+                <a:latin typeface="+mn-lt"/>
+                <a:ea typeface="+mn-ea"/>
+                <a:cs typeface="+mn-cs"/>
+              </a:rPr>
+              <a:t>When we create an Event, the client can only listen to the Event, where when we create a delegate, the client will get lot of control over application (He can add/remove methods in delegate.).</a:t>
+            </a:r>
+            <a:endParaRPr lang="en-US" dirty="0" smtClean="0"/>
+          </a:p>
+          <a:p>
+            <a:endParaRPr lang="en-IN" sz="1200" b="0" i="0" kern="1200" dirty="0" smtClean="0">
+              <a:solidFill>
+                <a:schemeClr val="tx1"/>
+              </a:solidFill>
+              <a:effectLst/>
+              <a:latin typeface="+mn-lt"/>
+              <a:ea typeface="+mn-ea"/>
+              <a:cs typeface="+mn-cs"/>
+            </a:endParaRPr>
+          </a:p>
+          <a:p>
+            <a:endParaRPr lang="en-US" dirty="0"/>
+          </a:p>
+        </p:txBody>
+      </p:sp>
+      <p:sp>
+        <p:nvSpPr>
+          <p:cNvPr id="4" name="Slide Number Placeholder 3"/>
+          <p:cNvSpPr>
+            <a:spLocks noGrp="1"/>
+          </p:cNvSpPr>
+          <p:nvPr>
+            <p:ph type="sldNum" sz="quarter" idx="10"/>
+          </p:nvPr>
+        </p:nvSpPr>
+        <p:spPr/>
+        <p:txBody>
+          <a:bodyPr/>
+          <a:lstStyle/>
+          <a:p>
+            <a:fld id="{7AE90029-A909-AD4E-9775-A0D64990AD22}" type="slidenum">
+              <a:rPr lang="en-US" smtClean="0"/>
+              <a:t>18</a:t>
+            </a:fld>
+            <a:endParaRPr lang="en-US"/>
+          </a:p>
+        </p:txBody>
+      </p:sp>
+    </p:spTree>
+    <p:extLst>
+      <p:ext uri="{BB962C8B-B14F-4D97-AF65-F5344CB8AC3E}">
+        <p14:creationId xmlns:p14="http://schemas.microsoft.com/office/powerpoint/2010/main" val="2330666926"/>
+      </p:ext>
+    </p:extLst>
+  </p:cSld>
+  <p:clrMapOvr>
+    <a:masterClrMapping/>
+  </p:clrMapOvr>
+</p:notes>
+</file>
+
+<file path=ppt/notesSlides/notesSlide7.xml><?xml version="1.0" encoding="utf-8"?>
+<p:notes xmlns:a="http://schemas.openxmlformats.org/drawingml/2006/main" xmlns:r="http://schemas.openxmlformats.org/officeDocument/2006/relationships" xmlns:p="http://schemas.openxmlformats.org/presentationml/2006/main">
+  <p:cSld>
+    <p:spTree>
+      <p:nvGrpSpPr>
+        <p:cNvPr id="1" name=""/>
+        <p:cNvGrpSpPr/>
+        <p:nvPr/>
+      </p:nvGrpSpPr>
+      <p:grpSpPr>
+        <a:xfrm>
+          <a:off x="0" y="0"/>
+          <a:ext cx="0" cy="0"/>
+          <a:chOff x="0" y="0"/>
+          <a:chExt cx="0" cy="0"/>
+        </a:xfrm>
+      </p:grpSpPr>
+      <p:sp>
+        <p:nvSpPr>
+          <p:cNvPr id="2" name="Slide Image Placeholder 1"/>
+          <p:cNvSpPr>
+            <a:spLocks noGrp="1" noRot="1" noChangeAspect="1"/>
+          </p:cNvSpPr>
+          <p:nvPr>
+            <p:ph type="sldImg"/>
+          </p:nvPr>
+        </p:nvSpPr>
+        <p:spPr/>
+      </p:sp>
+      <p:sp>
+        <p:nvSpPr>
+          <p:cNvPr id="3" name="Notes Placeholder 2"/>
+          <p:cNvSpPr>
+            <a:spLocks noGrp="1"/>
+          </p:cNvSpPr>
+          <p:nvPr>
+            <p:ph type="body" idx="1"/>
+          </p:nvPr>
+        </p:nvSpPr>
+        <p:spPr/>
+        <p:txBody>
+          <a:bodyPr/>
+          <a:lstStyle/>
+          <a:p>
+            <a:pPr marL="0" marR="0" indent="0" algn="l" defTabSz="457189" rtl="0" eaLnBrk="1" fontAlgn="auto" latinLnBrk="0" hangingPunct="1">
+              <a:lnSpc>
+                <a:spcPct val="100000"/>
+              </a:lnSpc>
+              <a:spcBef>
+                <a:spcPts val="0"/>
+              </a:spcBef>
+              <a:spcAft>
+                <a:spcPts val="0"/>
+              </a:spcAft>
+              <a:buClrTx/>
+              <a:buSzTx/>
+              <a:buFontTx/>
+              <a:buNone/>
+              <a:tabLst/>
+              <a:defRPr/>
+            </a:pPr>
+            <a:r>
+              <a:rPr lang="en-IN" sz="1200" b="1" i="0" kern="1200" dirty="0" smtClean="0">
+                <a:solidFill>
+                  <a:schemeClr val="tx1"/>
+                </a:solidFill>
+                <a:effectLst/>
+                <a:latin typeface="+mn-lt"/>
+                <a:ea typeface="+mn-ea"/>
+                <a:cs typeface="+mn-cs"/>
+              </a:rPr>
+              <a:t>Implementation of Event is a 3 step process.</a:t>
+            </a:r>
+            <a:endParaRPr lang="en-IN" sz="1200" b="0" i="0" kern="1200" dirty="0" smtClean="0">
+              <a:solidFill>
+                <a:schemeClr val="tx1"/>
+              </a:solidFill>
+              <a:effectLst/>
+              <a:latin typeface="+mn-lt"/>
+              <a:ea typeface="+mn-ea"/>
+              <a:cs typeface="+mn-cs"/>
+            </a:endParaRPr>
+          </a:p>
+          <a:p>
+            <a:pPr marL="228600" indent="-228600">
+              <a:buAutoNum type="arabicPeriod"/>
+            </a:pPr>
+            <a:r>
+              <a:rPr lang="en-IN" sz="1200" b="0" i="0" kern="1200" dirty="0" smtClean="0">
+                <a:solidFill>
+                  <a:schemeClr val="tx1"/>
+                </a:solidFill>
+                <a:effectLst/>
+                <a:latin typeface="+mn-lt"/>
+                <a:ea typeface="+mn-ea"/>
+                <a:cs typeface="+mn-cs"/>
+              </a:rPr>
+              <a:t>Declare - public delegate void </a:t>
+            </a:r>
+            <a:r>
+              <a:rPr lang="en-IN" sz="1200" b="0" i="0" kern="1200" dirty="0" err="1" smtClean="0">
+                <a:solidFill>
+                  <a:schemeClr val="tx1"/>
+                </a:solidFill>
+                <a:effectLst/>
+                <a:latin typeface="+mn-lt"/>
+                <a:ea typeface="+mn-ea"/>
+                <a:cs typeface="+mn-cs"/>
+              </a:rPr>
+              <a:t>CallEveryOne</a:t>
+            </a:r>
+            <a:r>
+              <a:rPr lang="en-IN" sz="1200" b="0" i="0" kern="1200" dirty="0" smtClean="0">
+                <a:solidFill>
+                  <a:schemeClr val="tx1"/>
+                </a:solidFill>
+                <a:effectLst/>
+                <a:latin typeface="+mn-lt"/>
+                <a:ea typeface="+mn-ea"/>
+                <a:cs typeface="+mn-cs"/>
+              </a:rPr>
+              <a:t>()</a:t>
+            </a:r>
+          </a:p>
+          <a:p>
+            <a:pPr marL="228600" indent="-228600">
+              <a:buAutoNum type="arabicPeriod"/>
+            </a:pPr>
+            <a:r>
+              <a:rPr lang="en-IN" sz="1200" b="0" i="0" kern="1200" dirty="0" smtClean="0">
+                <a:solidFill>
+                  <a:schemeClr val="tx1"/>
+                </a:solidFill>
+                <a:effectLst/>
+                <a:latin typeface="+mn-lt"/>
+                <a:ea typeface="+mn-ea"/>
+                <a:cs typeface="+mn-cs"/>
+              </a:rPr>
+              <a:t>Create - public Event </a:t>
+            </a:r>
+            <a:r>
+              <a:rPr lang="en-IN" sz="1200" b="0" i="0" kern="1200" dirty="0" err="1" smtClean="0">
+                <a:solidFill>
+                  <a:schemeClr val="tx1"/>
+                </a:solidFill>
+                <a:effectLst/>
+                <a:latin typeface="+mn-lt"/>
+                <a:ea typeface="+mn-ea"/>
+                <a:cs typeface="+mn-cs"/>
+              </a:rPr>
+              <a:t>CallEveryOne</a:t>
+            </a:r>
+            <a:r>
+              <a:rPr lang="en-IN" sz="1200" b="0" i="0" kern="1200" dirty="0" smtClean="0">
+                <a:solidFill>
+                  <a:schemeClr val="tx1"/>
+                </a:solidFill>
+                <a:effectLst/>
+                <a:latin typeface="+mn-lt"/>
+                <a:ea typeface="+mn-ea"/>
+                <a:cs typeface="+mn-cs"/>
+              </a:rPr>
+              <a:t> </a:t>
+            </a:r>
+            <a:r>
+              <a:rPr lang="en-IN" sz="1200" b="0" i="0" kern="1200" dirty="0" err="1" smtClean="0">
+                <a:solidFill>
+                  <a:schemeClr val="tx1"/>
+                </a:solidFill>
+                <a:effectLst/>
+                <a:latin typeface="+mn-lt"/>
+                <a:ea typeface="+mn-ea"/>
+                <a:cs typeface="+mn-cs"/>
+              </a:rPr>
+              <a:t>objEventCallEveryOne</a:t>
+            </a:r>
+            <a:r>
+              <a:rPr lang="en-IN" sz="1200" b="0" i="0" kern="1200" dirty="0" smtClean="0">
+                <a:solidFill>
+                  <a:schemeClr val="tx1"/>
+                </a:solidFill>
+                <a:effectLst/>
+                <a:latin typeface="+mn-lt"/>
+                <a:ea typeface="+mn-ea"/>
+                <a:cs typeface="+mn-cs"/>
+              </a:rPr>
+              <a:t>;</a:t>
+            </a:r>
+          </a:p>
+          <a:p>
+            <a:pPr marL="228600" indent="-228600">
+              <a:buAutoNum type="arabicPeriod"/>
+            </a:pPr>
+            <a:r>
+              <a:rPr lang="en-IN" sz="1200" b="0" i="0" kern="1200" dirty="0" smtClean="0">
+                <a:solidFill>
+                  <a:schemeClr val="tx1"/>
+                </a:solidFill>
+                <a:effectLst/>
+                <a:latin typeface="+mn-lt"/>
+                <a:ea typeface="+mn-ea"/>
+                <a:cs typeface="+mn-cs"/>
+              </a:rPr>
+              <a:t>Call- </a:t>
+            </a:r>
+            <a:r>
+              <a:rPr lang="en-IN" sz="1200" b="0" i="0" kern="1200" dirty="0" err="1" smtClean="0">
+                <a:solidFill>
+                  <a:schemeClr val="tx1"/>
+                </a:solidFill>
+                <a:effectLst/>
+                <a:latin typeface="+mn-lt"/>
+                <a:ea typeface="+mn-ea"/>
+                <a:cs typeface="+mn-cs"/>
+              </a:rPr>
+              <a:t>objEventCallEveryOne</a:t>
+            </a:r>
+            <a:r>
+              <a:rPr lang="en-IN" sz="1200" b="0" i="0" kern="1200" dirty="0" smtClean="0">
+                <a:solidFill>
+                  <a:schemeClr val="tx1"/>
+                </a:solidFill>
+                <a:effectLst/>
+                <a:latin typeface="+mn-lt"/>
+                <a:ea typeface="+mn-ea"/>
+                <a:cs typeface="+mn-cs"/>
+              </a:rPr>
+              <a:t>;</a:t>
+            </a:r>
+          </a:p>
+          <a:p>
+            <a:pPr marL="0" indent="0">
+              <a:buNone/>
+            </a:pPr>
+            <a:endParaRPr lang="en-IN" sz="1200" b="0" i="0" kern="1200" dirty="0" smtClean="0">
+              <a:solidFill>
+                <a:schemeClr val="tx1"/>
+              </a:solidFill>
+              <a:effectLst/>
+              <a:latin typeface="+mn-lt"/>
+              <a:ea typeface="+mn-ea"/>
+              <a:cs typeface="+mn-cs"/>
+            </a:endParaRPr>
+          </a:p>
+          <a:p>
+            <a:pPr marL="0" marR="0" indent="0" algn="l" defTabSz="457189" rtl="0" eaLnBrk="1" fontAlgn="auto" latinLnBrk="0" hangingPunct="1">
+              <a:lnSpc>
+                <a:spcPct val="100000"/>
+              </a:lnSpc>
+              <a:spcBef>
+                <a:spcPts val="0"/>
+              </a:spcBef>
+              <a:spcAft>
+                <a:spcPts val="0"/>
+              </a:spcAft>
+              <a:buClrTx/>
+              <a:buSzTx/>
+              <a:buFontTx/>
+              <a:buNone/>
+              <a:tabLst/>
+              <a:defRPr/>
+            </a:pPr>
+            <a:r>
+              <a:rPr lang="en-IN" sz="1200" b="1" i="0" kern="1200" dirty="0" smtClean="0">
+                <a:solidFill>
+                  <a:schemeClr val="tx1"/>
+                </a:solidFill>
+                <a:effectLst/>
+                <a:latin typeface="+mn-lt"/>
+                <a:ea typeface="+mn-ea"/>
+                <a:cs typeface="+mn-cs"/>
+              </a:rPr>
+              <a:t>Difference between Delegates and Events</a:t>
+            </a:r>
+            <a:endParaRPr lang="en-US" dirty="0" smtClean="0"/>
+          </a:p>
+          <a:p>
+            <a:r>
+              <a:rPr lang="en-IN" sz="1200" b="0" i="0" kern="1200" dirty="0" smtClean="0">
+                <a:solidFill>
+                  <a:schemeClr val="tx1"/>
+                </a:solidFill>
+                <a:effectLst/>
+                <a:latin typeface="+mn-lt"/>
+                <a:ea typeface="+mn-ea"/>
+                <a:cs typeface="+mn-cs"/>
+              </a:rPr>
+              <a:t>When we create an Event, the client can only listen to the Event, where when we create a delegate, the client will get lot of control over application (He can add/remove methods in delegate.).</a:t>
+            </a:r>
+            <a:endParaRPr lang="en-US" dirty="0"/>
+          </a:p>
+        </p:txBody>
+      </p:sp>
+      <p:sp>
+        <p:nvSpPr>
+          <p:cNvPr id="4" name="Slide Number Placeholder 3"/>
+          <p:cNvSpPr>
+            <a:spLocks noGrp="1"/>
+          </p:cNvSpPr>
+          <p:nvPr>
+            <p:ph type="sldNum" sz="quarter" idx="10"/>
+          </p:nvPr>
+        </p:nvSpPr>
+        <p:spPr/>
+        <p:txBody>
+          <a:bodyPr/>
+          <a:lstStyle/>
+          <a:p>
+            <a:fld id="{7AE90029-A909-AD4E-9775-A0D64990AD22}" type="slidenum">
+              <a:rPr lang="en-US" smtClean="0"/>
+              <a:t>19</a:t>
+            </a:fld>
+            <a:endParaRPr lang="en-US"/>
+          </a:p>
+        </p:txBody>
+      </p:sp>
+    </p:spTree>
+    <p:extLst>
+      <p:ext uri="{BB962C8B-B14F-4D97-AF65-F5344CB8AC3E}">
+        <p14:creationId xmlns:p14="http://schemas.microsoft.com/office/powerpoint/2010/main" val="1037175802"/>
       </p:ext>
     </p:extLst>
   </p:cSld>
@@ -2483,7 +3324,7 @@
           <a:p>
             <a:fld id="{DBFF031D-E949-4848-881B-2F4C2D3BEB74}" type="datetimeFigureOut">
               <a:rPr lang="en-US" smtClean="0"/>
-              <a:t>06-Dec-17</a:t>
+              <a:t>09-Dec-17</a:t>
             </a:fld>
             <a:endParaRPr lang="en-US"/>
           </a:p>
@@ -22992,24 +23833,6 @@
 </file>
 
 <file path=customXml/item1.xml><?xml version="1.0" encoding="utf-8"?>
-<p:properties xmlns:p="http://schemas.microsoft.com/office/2006/metadata/properties" xmlns:xsi="http://www.w3.org/2001/XMLSchema-instance" xmlns:pc="http://schemas.microsoft.com/office/infopath/2007/PartnerControls">
-  <documentManagement>
-    <PublishingExpirationDate xmlns="http://schemas.microsoft.com/sharepoint/v3" xsi:nil="true"/>
-    <PublishingStartDate xmlns="http://schemas.microsoft.com/sharepoint/v3" xsi:nil="true"/>
-  </documentManagement>
-</p:properties>
-</file>
-
-<file path=customXml/item2.xml><?xml version="1.0" encoding="utf-8"?>
-<?mso-contentType ?>
-<FormTemplates xmlns="http://schemas.microsoft.com/sharepoint/v3/contenttype/forms">
-  <Display>DocumentLibraryForm</Display>
-  <Edit>DocumentLibraryForm</Edit>
-  <New>DocumentLibraryForm</New>
-</FormTemplates>
-</file>
-
-<file path=customXml/item3.xml><?xml version="1.0" encoding="utf-8"?>
 <ct:contentTypeSchema xmlns:ct="http://schemas.microsoft.com/office/2006/metadata/contentType" xmlns:ma="http://schemas.microsoft.com/office/2006/metadata/properties/metaAttributes" ct:_="" ma:_="" ma:contentTypeName="Document" ma:contentTypeID="0x010100B0E9A4A7D20EA84CAA39F80EA2A19865" ma:contentTypeVersion="1" ma:contentTypeDescription="Create a new document." ma:contentTypeScope="" ma:versionID="4ed0c655cf5595f31b06ef1418ca28bf">
   <xsd:schema xmlns:xsd="http://www.w3.org/2001/XMLSchema" xmlns:xs="http://www.w3.org/2001/XMLSchema" xmlns:p="http://schemas.microsoft.com/office/2006/metadata/properties" xmlns:ns1="http://schemas.microsoft.com/sharepoint/v3" targetNamespace="http://schemas.microsoft.com/office/2006/metadata/properties" ma:root="true" ma:fieldsID="4dcce58c87e9fcebab8021569449a8d0" ns1:_="">
     <xsd:import namespace="http://schemas.microsoft.com/sharepoint/v3"/>
@@ -23141,31 +23964,25 @@
 </ct:contentTypeSchema>
 </file>
 
-<file path=customXml/itemProps1.xml><?xml version="1.0" encoding="utf-8"?>
-<ds:datastoreItem xmlns:ds="http://schemas.openxmlformats.org/officeDocument/2006/customXml" ds:itemID="{D5E3C081-4081-47AD-A9A6-9F18F525DA1D}">
-  <ds:schemaRefs>
-    <ds:schemaRef ds:uri="http://schemas.microsoft.com/office/2006/metadata/properties"/>
-    <ds:schemaRef ds:uri="http://purl.org/dc/dcmitype/"/>
-    <ds:schemaRef ds:uri="http://purl.org/dc/elements/1.1/"/>
-    <ds:schemaRef ds:uri="http://schemas.microsoft.com/sharepoint/v3"/>
-    <ds:schemaRef ds:uri="http://schemas.microsoft.com/office/2006/documentManagement/types"/>
-    <ds:schemaRef ds:uri="http://purl.org/dc/terms/"/>
-    <ds:schemaRef ds:uri="http://schemas.microsoft.com/office/infopath/2007/PartnerControls"/>
-    <ds:schemaRef ds:uri="http://schemas.openxmlformats.org/package/2006/metadata/core-properties"/>
-    <ds:schemaRef ds:uri="http://www.w3.org/XML/1998/namespace"/>
-  </ds:schemaRefs>
-</ds:datastoreItem>
+<file path=customXml/item2.xml><?xml version="1.0" encoding="utf-8"?>
+<?mso-contentType ?>
+<FormTemplates xmlns="http://schemas.microsoft.com/sharepoint/v3/contenttype/forms">
+  <Display>DocumentLibraryForm</Display>
+  <Edit>DocumentLibraryForm</Edit>
+  <New>DocumentLibraryForm</New>
+</FormTemplates>
 </file>
 
-<file path=customXml/itemProps2.xml><?xml version="1.0" encoding="utf-8"?>
-<ds:datastoreItem xmlns:ds="http://schemas.openxmlformats.org/officeDocument/2006/customXml" ds:itemID="{14883F0F-DE57-4ECA-B9BB-F22E8C5B5D82}">
-  <ds:schemaRefs>
-    <ds:schemaRef ds:uri="http://schemas.microsoft.com/sharepoint/v3/contenttype/forms"/>
-  </ds:schemaRefs>
-</ds:datastoreItem>
+<file path=customXml/item3.xml><?xml version="1.0" encoding="utf-8"?>
+<p:properties xmlns:p="http://schemas.microsoft.com/office/2006/metadata/properties" xmlns:xsi="http://www.w3.org/2001/XMLSchema-instance" xmlns:pc="http://schemas.microsoft.com/office/infopath/2007/PartnerControls">
+  <documentManagement>
+    <PublishingExpirationDate xmlns="http://schemas.microsoft.com/sharepoint/v3" xsi:nil="true"/>
+    <PublishingStartDate xmlns="http://schemas.microsoft.com/sharepoint/v3" xsi:nil="true"/>
+  </documentManagement>
+</p:properties>
 </file>
 
-<file path=customXml/itemProps3.xml><?xml version="1.0" encoding="utf-8"?>
+<file path=customXml/itemProps1.xml><?xml version="1.0" encoding="utf-8"?>
 <ds:datastoreItem xmlns:ds="http://schemas.openxmlformats.org/officeDocument/2006/customXml" ds:itemID="{C3A1A37E-F8E3-427A-BCE9-B1DDB8B96CDF}">
   <ds:schemaRefs>
     <ds:schemaRef ds:uri="http://schemas.microsoft.com/office/2006/metadata/contentType"/>
@@ -23181,4 +23998,28 @@
     <ds:schemaRef ds:uri="http://schemas.microsoft.com/internal/obd"/>
   </ds:schemaRefs>
 </ds:datastoreItem>
+</file>
+
+<file path=customXml/itemProps2.xml><?xml version="1.0" encoding="utf-8"?>
+<ds:datastoreItem xmlns:ds="http://schemas.openxmlformats.org/officeDocument/2006/customXml" ds:itemID="{14883F0F-DE57-4ECA-B9BB-F22E8C5B5D82}">
+  <ds:schemaRefs>
+    <ds:schemaRef ds:uri="http://schemas.microsoft.com/sharepoint/v3/contenttype/forms"/>
+  </ds:schemaRefs>
+</ds:datastoreItem>
+</file>
+
+<file path=customXml/itemProps3.xml><?xml version="1.0" encoding="utf-8"?>
+<ds:datastoreItem xmlns:ds="http://schemas.openxmlformats.org/officeDocument/2006/customXml" ds:itemID="{D5E3C081-4081-47AD-A9A6-9F18F525DA1D}">
+  <ds:schemaRefs>
+    <ds:schemaRef ds:uri="http://schemas.microsoft.com/office/2006/metadata/properties"/>
+    <ds:schemaRef ds:uri="http://purl.org/dc/dcmitype/"/>
+    <ds:schemaRef ds:uri="http://purl.org/dc/elements/1.1/"/>
+    <ds:schemaRef ds:uri="http://schemas.microsoft.com/sharepoint/v3"/>
+    <ds:schemaRef ds:uri="http://schemas.microsoft.com/office/2006/documentManagement/types"/>
+    <ds:schemaRef ds:uri="http://purl.org/dc/terms/"/>
+    <ds:schemaRef ds:uri="http://schemas.microsoft.com/office/infopath/2007/PartnerControls"/>
+    <ds:schemaRef ds:uri="http://schemas.openxmlformats.org/package/2006/metadata/core-properties"/>
+    <ds:schemaRef ds:uri="http://www.w3.org/XML/1998/namespace"/>
+  </ds:schemaRefs>
+</ds:datastoreItem>
 </file>
</xml_diff>